<commit_message>
notebook can generate ppt now
</commit_message>
<xml_diff>
--- a/presentation.pptx
+++ b/presentation.pptx
@@ -15,9 +15,6 @@
     <p:sldId id="263" r:id="rId14"/>
     <p:sldId id="264" r:id="rId15"/>
     <p:sldId id="265" r:id="rId16"/>
-    <p:sldId id="266" r:id="rId17"/>
-    <p:sldId id="267" r:id="rId18"/>
-    <p:sldId id="268" r:id="rId19"/>
   </p:sldIdLst>
   <p:sldSz cx="9144000" cy="6858000" type="screen4x3"/>
   <p:notesSz cx="6858000" cy="9144000"/>
@@ -3116,7 +3113,7 @@
           <a:lstStyle/>
           <a:p>
             <a:r>
-              <a:t>Introduction</a:t>
+              <a:t>Title</a:t>
             </a:r>
           </a:p>
         </p:txBody>
@@ -3137,25 +3134,7 @@
           <a:lstStyle/>
           <a:p>
             <a:r>
-              <a:t>Paper Title: XCon: Learning with Experts for Fine-grained Category Discovery</a:t>
-            </a:r>
-          </a:p>
-          <a:p/>
-          <a:p>
-            <a:r>
-              <a:t>Problem Addressed: Generalized Category Discovery (GCD)</a:t>
-            </a:r>
-          </a:p>
-          <a:p/>
-          <a:p>
-            <a:r>
-              <a:t>Methodology: Expert-Contrastive Learning (XCon)</a:t>
-            </a:r>
-          </a:p>
-          <a:p/>
-          <a:p>
-            <a:r>
-              <a:t>Key Results: Improved performance over previous methods</a:t>
+              <a:t>Learning with Experts for Fine-grained Category Discovery</a:t>
             </a:r>
           </a:p>
         </p:txBody>
@@ -3194,7 +3173,7 @@
           <a:lstStyle/>
           <a:p>
             <a:r>
-              <a:t>Qualitative Analysis</a:t>
+              <a:t>Conclusion</a:t>
             </a:r>
           </a:p>
         </p:txBody>
@@ -3215,199 +3194,17 @@
           <a:lstStyle/>
           <a:p>
             <a:r>
-              <a:t>Visualization of features using t-SNE for qualitative comparison.</a:t>
-            </a:r>
-          </a:p>
-          <a:p/>
-          <a:p>
-            <a:r>
-              <a:t>Clear boundaries between different groups with XCon, corresponding to specific categories.</a:t>
-            </a:r>
-          </a:p>
-        </p:txBody>
-      </p:sp>
-    </p:spTree>
-  </p:cSld>
-  <p:clrMapOvr>
-    <a:masterClrMapping/>
-  </p:clrMapOvr>
-</p:sld>
-</file>
-
-<file path=ppt/slides/slide11.xml><?xml version="1.0" encoding="utf-8"?>
-<p:sld xmlns:a="http://schemas.openxmlformats.org/drawingml/2006/main" xmlns:p="http://schemas.openxmlformats.org/presentationml/2006/main" xmlns:r="http://schemas.openxmlformats.org/officeDocument/2006/relationships">
-  <p:cSld>
-    <p:spTree>
-      <p:nvGrpSpPr>
-        <p:cNvPr id="1" name=""/>
-        <p:cNvGrpSpPr/>
-        <p:nvPr/>
-      </p:nvGrpSpPr>
-      <p:grpSpPr/>
-      <p:sp>
-        <p:nvSpPr>
-          <p:cNvPr id="2" name="Title 1"/>
-          <p:cNvSpPr>
-            <a:spLocks noGrp="1"/>
-          </p:cNvSpPr>
-          <p:nvPr>
-            <p:ph type="title"/>
-          </p:nvPr>
-        </p:nvSpPr>
-        <p:spPr/>
-        <p:txBody>
-          <a:bodyPr/>
-          <a:lstStyle/>
-          <a:p>
-            <a:r>
-              <a:t>Conclusion</a:t>
-            </a:r>
-          </a:p>
-        </p:txBody>
-      </p:sp>
-      <p:sp>
-        <p:nvSpPr>
-          <p:cNvPr id="3" name="Content Placeholder 2"/>
-          <p:cNvSpPr>
-            <a:spLocks noGrp="1"/>
-          </p:cNvSpPr>
-          <p:nvPr>
-            <p:ph idx="1"/>
-          </p:nvPr>
-        </p:nvSpPr>
-        <p:spPr/>
-        <p:txBody>
-          <a:bodyPr/>
-          <a:lstStyle/>
-          <a:p>
-            <a:r>
-              <a:t>Proposal of XCon for generalized category discovery with self-supervised representation.</a:t>
-            </a:r>
-          </a:p>
-          <a:p/>
-          <a:p>
-            <a:r>
-              <a:t>Improved performance on image classification benchmarks, validating the method's effectiveness.</a:t>
-            </a:r>
-          </a:p>
-        </p:txBody>
-      </p:sp>
-    </p:spTree>
-  </p:cSld>
-  <p:clrMapOvr>
-    <a:masterClrMapping/>
-  </p:clrMapOvr>
-</p:sld>
-</file>
-
-<file path=ppt/slides/slide12.xml><?xml version="1.0" encoding="utf-8"?>
-<p:sld xmlns:a="http://schemas.openxmlformats.org/drawingml/2006/main" xmlns:p="http://schemas.openxmlformats.org/presentationml/2006/main" xmlns:r="http://schemas.openxmlformats.org/officeDocument/2006/relationships">
-  <p:cSld>
-    <p:spTree>
-      <p:nvGrpSpPr>
-        <p:cNvPr id="1" name=""/>
-        <p:cNvGrpSpPr/>
-        <p:nvPr/>
-      </p:nvGrpSpPr>
-      <p:grpSpPr/>
-      <p:sp>
-        <p:nvSpPr>
-          <p:cNvPr id="2" name="Title 1"/>
-          <p:cNvSpPr>
-            <a:spLocks noGrp="1"/>
-          </p:cNvSpPr>
-          <p:nvPr>
-            <p:ph type="title"/>
-          </p:nvPr>
-        </p:nvSpPr>
-        <p:spPr/>
-        <p:txBody>
-          <a:bodyPr/>
-          <a:lstStyle/>
-          <a:p>
-            <a:r>
-              <a:t>Acknowledgments</a:t>
-            </a:r>
-          </a:p>
-        </p:txBody>
-      </p:sp>
-      <p:sp>
-        <p:nvSpPr>
-          <p:cNvPr id="3" name="Content Placeholder 2"/>
-          <p:cNvSpPr>
-            <a:spLocks noGrp="1"/>
-          </p:cNvSpPr>
-          <p:nvPr>
-            <p:ph idx="1"/>
-          </p:nvPr>
-        </p:nvSpPr>
-        <p:spPr/>
-        <p:txBody>
-          <a:bodyPr/>
-          <a:lstStyle/>
-          <a:p>
-            <a:r>
-              <a:t>Acknowledgment of compute support from LunarAI.</a:t>
-            </a:r>
-          </a:p>
-        </p:txBody>
-      </p:sp>
-    </p:spTree>
-  </p:cSld>
-  <p:clrMapOvr>
-    <a:masterClrMapping/>
-  </p:clrMapOvr>
-</p:sld>
-</file>
-
-<file path=ppt/slides/slide13.xml><?xml version="1.0" encoding="utf-8"?>
-<p:sld xmlns:a="http://schemas.openxmlformats.org/drawingml/2006/main" xmlns:p="http://schemas.openxmlformats.org/presentationml/2006/main" xmlns:r="http://schemas.openxmlformats.org/officeDocument/2006/relationships">
-  <p:cSld>
-    <p:spTree>
-      <p:nvGrpSpPr>
-        <p:cNvPr id="1" name=""/>
-        <p:cNvGrpSpPr/>
-        <p:nvPr/>
-      </p:nvGrpSpPr>
-      <p:grpSpPr/>
-      <p:sp>
-        <p:nvSpPr>
-          <p:cNvPr id="2" name="Title 1"/>
-          <p:cNvSpPr>
-            <a:spLocks noGrp="1"/>
-          </p:cNvSpPr>
-          <p:nvPr>
-            <p:ph type="title"/>
-          </p:nvPr>
-        </p:nvSpPr>
-        <p:spPr/>
-        <p:txBody>
-          <a:bodyPr/>
-          <a:lstStyle/>
-          <a:p>
-            <a:r>
-              <a:t>References</a:t>
-            </a:r>
-          </a:p>
-        </p:txBody>
-      </p:sp>
-      <p:sp>
-        <p:nvSpPr>
-          <p:cNvPr id="3" name="Content Placeholder 2"/>
-          <p:cNvSpPr>
-            <a:spLocks noGrp="1"/>
-          </p:cNvSpPr>
-          <p:nvPr>
-            <p:ph idx="1"/>
-          </p:nvPr>
-        </p:nvSpPr>
-        <p:spPr/>
-        <p:txBody>
-          <a:bodyPr/>
-          <a:lstStyle/>
-          <a:p>
-            <a:r>
-              <a:t>Relevant papers and resources cited in the presentation for further reading.</a:t>
+              <a:t>- XCon addresses GCD with self-supervised representation</a:t>
+            </a:r>
+          </a:p>
+          <a:p>
+            <a:r>
+              <a:t>- Achieving improved performance in fine-grained category discovery</a:t>
+            </a:r>
+          </a:p>
+          <a:p>
+            <a:r>
+              <a:t>- Validation of method effectiveness through experiments and comparisons</a:t>
             </a:r>
           </a:p>
         </p:txBody>
@@ -3446,7 +3243,7 @@
           <a:lstStyle/>
           <a:p>
             <a:r>
-              <a:t>Background and Motivation</a:t>
+              <a:t>Introduction</a:t>
             </a:r>
           </a:p>
         </p:txBody>
@@ -3467,25 +3264,17 @@
           <a:lstStyle/>
           <a:p>
             <a:r>
-              <a:t>Challenge: Generic category discovery requires large datasets like ImageNet or COCO, which may not always be feasible.</a:t>
-            </a:r>
-          </a:p>
-          <a:p/>
-          <a:p>
-            <a:r>
-              <a:t>Formalization of GCD: Leveraging unlabeled data to discover categories, focusing on fine-grained concepts.</a:t>
-            </a:r>
-          </a:p>
-          <a:p/>
-          <a:p>
-            <a:r>
-              <a:t>Limitation of Existing Approaches: Unsupervised representations may cluster data based on irrelevant cues.</a:t>
-            </a:r>
-          </a:p>
-          <a:p/>
-          <a:p>
-            <a:r>
-              <a:t>Proposed Solution: Expert Contrastive Learning (XCon) to eliminate negative influences and discover fine-grained categories effectively.</a:t>
+              <a:t>- Addressing the problem of generalized category discovery (GCD)</a:t>
+            </a:r>
+          </a:p>
+          <a:p>
+            <a:r>
+              <a:t>- Introducing Expert-Contrastive Learning (XCon) method for mining useful information from images</a:t>
+            </a:r>
+          </a:p>
+          <a:p>
+            <a:r>
+              <a:t>- Utilizing k-means clustering and contrastive learning on sub-datasets for learning discriminative features</a:t>
             </a:r>
           </a:p>
         </p:txBody>
@@ -3524,7 +3313,7 @@
           <a:lstStyle/>
           <a:p>
             <a:r>
-              <a:t>Methodology Overview</a:t>
+              <a:t>Problem Statement</a:t>
             </a:r>
           </a:p>
         </p:txBody>
@@ -3545,19 +3334,17 @@
           <a:lstStyle/>
           <a:p>
             <a:r>
-              <a:t>XCon Method: Partition data into k expert sub-datasets using k-means clustering.</a:t>
-            </a:r>
-          </a:p>
-          <a:p/>
-          <a:p>
-            <a:r>
-              <a:t>Each sub-dataset treated as an expert dataset to eliminate negative influences.</a:t>
-            </a:r>
-          </a:p>
-          <a:p/>
-          <a:p>
-            <a:r>
-              <a:t>Objective: Learn discriminative features for fine-grained category discovery.</a:t>
+              <a:t>- GCD involves discovering categories within unlabeled data by leveraging information</a:t>
+            </a:r>
+          </a:p>
+          <a:p>
+            <a:r>
+              <a:t>- Existing methods tend to cluster based on class-irrelevant cues, leading to suboptimal results</a:t>
+            </a:r>
+          </a:p>
+          <a:p>
+            <a:r>
+              <a:t>- Need for fine-grained category discovery with a focus on relevant concepts</a:t>
             </a:r>
           </a:p>
         </p:txBody>
@@ -3596,7 +3383,7 @@
           <a:lstStyle/>
           <a:p>
             <a:r>
-              <a:t>Contrastive Learning in XCon</a:t>
+              <a:t>XCon Methodology</a:t>
             </a:r>
           </a:p>
         </p:txBody>
@@ -3617,19 +3404,17 @@
           <a:lstStyle/>
           <a:p>
             <a:r>
-              <a:t>Utilizing k-means grouping on self-supervised features for informative contrastive pairs.</a:t>
-            </a:r>
-          </a:p>
-          <a:p/>
-          <a:p>
-            <a:r>
-              <a:t>Joint contrastive representation learning on partitioned sub-datasets.</a:t>
-            </a:r>
-          </a:p>
-          <a:p/>
-          <a:p>
-            <a:r>
-              <a:t>Clear performance improvements over previous GCD methods with contrastive learning.</a:t>
+              <a:t>- Partitioning data into k expert sub-datasets using k-means clustering on self-supervised representations</a:t>
+            </a:r>
+          </a:p>
+          <a:p>
+            <a:r>
+              <a:t>- Each sub-dataset acts as an expert dataset to eliminate negative influences of class-irrelevant cues</a:t>
+            </a:r>
+          </a:p>
+          <a:p>
+            <a:r>
+              <a:t>- Learning discriminative features for fine-grained category discovery</a:t>
             </a:r>
           </a:p>
         </p:txBody>
@@ -3668,7 +3453,7 @@
           <a:lstStyle/>
           <a:p>
             <a:r>
-              <a:t>Representation Learning Challenges</a:t>
+              <a:t>Novel Category Discovery</a:t>
             </a:r>
           </a:p>
         </p:txBody>
@@ -3689,19 +3474,17 @@
           <a:lstStyle/>
           <a:p>
             <a:r>
-              <a:t>Challenge: Representations need to be sensitive to detailed discriminative traits.</a:t>
-            </a:r>
-          </a:p>
-          <a:p/>
-          <a:p>
-            <a:r>
-              <a:t>Leveraging self-supervised representations for rough clustering based on overall image statistics.</a:t>
-            </a:r>
-          </a:p>
-          <a:p/>
-          <a:p>
-            <a:r>
-              <a:t>Proposed approach: Supervised and self-supervised contrastive loss to fine-tune the model.</a:t>
+              <a:t>- Objective: Discover new object categories by transferring knowledge learned from seen classes</a:t>
+            </a:r>
+          </a:p>
+          <a:p>
+            <a:r>
+              <a:t>- XCon partitions data into k sub-datasets for learning discriminative representations</a:t>
+            </a:r>
+          </a:p>
+          <a:p>
+            <a:r>
+              <a:t>- Setting a new state-of-the-art performance on tested category discovery benchmarks</a:t>
             </a:r>
           </a:p>
         </p:txBody>
@@ -3740,7 +3523,7 @@
           <a:lstStyle/>
           <a:p>
             <a:r>
-              <a:t>Evaluation Metrics</a:t>
+              <a:t>Previous Work</a:t>
             </a:r>
           </a:p>
         </p:txBody>
@@ -3761,13 +3544,17 @@
           <a:lstStyle/>
           <a:p>
             <a:r>
-              <a:t>Splitting training data into labeled (Dl) and unlabeled (Du) datasets.</a:t>
-            </a:r>
-          </a:p>
-          <a:p/>
-          <a:p>
-            <a:r>
-              <a:t>Measuring performance using clustering accuracy (ACC) on the unlabeled set.</a:t>
+              <a:t>- Contrastive learning in NCD problem by NCL</a:t>
+            </a:r>
+          </a:p>
+          <a:p>
+            <a:r>
+              <a:t>- Using k-means grouping on self-supervised features for informative contrastive pairs</a:t>
+            </a:r>
+          </a:p>
+          <a:p>
+            <a:r>
+              <a:t>- Focus on Generalized Category Discovery for effective representation learning</a:t>
             </a:r>
           </a:p>
         </p:txBody>
@@ -3806,7 +3593,7 @@
           <a:lstStyle/>
           <a:p>
             <a:r>
-              <a:t>Experimental Setup</a:t>
+              <a:t>Experimental Results (Generic Datasets)</a:t>
             </a:r>
           </a:p>
         </p:txBody>
@@ -3827,25 +3614,17 @@
           <a:lstStyle/>
           <a:p>
             <a:r>
-              <a:t>Backbone: ViT-B-16</a:t>
-            </a:r>
-          </a:p>
-          <a:p/>
-          <a:p>
-            <a:r>
-              <a:t>Batch size: 256</a:t>
-            </a:r>
-          </a:p>
-          <a:p/>
-          <a:p>
-            <a:r>
-              <a:t>Training epochs: 60 for ImageNet dataset</a:t>
-            </a:r>
-          </a:p>
-          <a:p/>
-          <a:p>
-            <a:r>
-              <a:t>Implementation: Projection heads as three-layer MLPs</a:t>
+              <a:t>- Results on CIFAR10, CIFAR100, Stanford Cars, etc.</a:t>
+            </a:r>
+          </a:p>
+          <a:p>
+            <a:r>
+              <a:t>- XCon outperforms baseline methods, showing consistent improvement</a:t>
+            </a:r>
+          </a:p>
+          <a:p>
+            <a:r>
+              <a:t>- Evaluation metric: Clustering accuracy (ACC) on unlabeled dataset</a:t>
             </a:r>
           </a:p>
         </p:txBody>
@@ -3884,7 +3663,7 @@
           <a:lstStyle/>
           <a:p>
             <a:r>
-              <a:t>Results on Generic Datasets</a:t>
+              <a:t>Experimental Results (Fine-grained Datasets)</a:t>
             </a:r>
           </a:p>
         </p:txBody>
@@ -3905,13 +3684,17 @@
           <a:lstStyle/>
           <a:p>
             <a:r>
-              <a:t>Comparison with state-of-the-art methods on CIFAR10, 100, 200, and Stanford Cars.</a:t>
-            </a:r>
-          </a:p>
-          <a:p/>
-          <a:p>
-            <a:r>
-              <a:t>XCon consistently outperforms baseline methods, demonstrating robust effectiveness.</a:t>
+              <a:t>- Performance on fine-grained image classification benchmarks</a:t>
+            </a:r>
+          </a:p>
+          <a:p>
+            <a:r>
+              <a:t>- Improved ACC on CUB-200 and Stanford Cars with XCon</a:t>
+            </a:r>
+          </a:p>
+          <a:p>
+            <a:r>
+              <a:t>- Analysis of weight parameter α for fine-grained loss</a:t>
             </a:r>
           </a:p>
         </p:txBody>
@@ -3950,7 +3733,7 @@
           <a:lstStyle/>
           <a:p>
             <a:r>
-              <a:t>Results on Fine-grained Datasets</a:t>
+              <a:t>Qualitative Analysis</a:t>
             </a:r>
           </a:p>
         </p:txBody>
@@ -3971,13 +3754,17 @@
           <a:lstStyle/>
           <a:p>
             <a:r>
-              <a:t>Performance improvements on CUB-200 and Stanford Cars benchmarks.</a:t>
-            </a:r>
-          </a:p>
-          <a:p/>
-          <a:p>
-            <a:r>
-              <a:t>XCon's effectiveness across different α values analyzed.</a:t>
+              <a:t>- Visualization of feature space with XCon compared to DINO</a:t>
+            </a:r>
+          </a:p>
+          <a:p>
+            <a:r>
+              <a:t>- Clear boundaries between groups corresponding to different categories</a:t>
+            </a:r>
+          </a:p>
+          <a:p>
+            <a:r>
+              <a:t>- Demonstrating discriminative features learned by XCon</a:t>
             </a:r>
           </a:p>
         </p:txBody>

</xml_diff>

<commit_message>
update summarizer to keep output shorter than 4096 tokens
</commit_message>
<xml_diff>
--- a/presentation.pptx
+++ b/presentation.pptx
@@ -3194,17 +3194,17 @@
           <a:lstStyle/>
           <a:p>
             <a:r>
-              <a:t>- XCon addresses GCD with self-supervised representation</a:t>
-            </a:r>
-          </a:p>
-          <a:p>
-            <a:r>
-              <a:t>- Achieving improved performance in fine-grained category discovery</a:t>
-            </a:r>
-          </a:p>
-          <a:p>
-            <a:r>
-              <a:t>- Validation of method effectiveness through experiments and comparisons</a:t>
+              <a:t>- Proposing XCon for Generalized Category Discovery with self-supervised representation</a:t>
+            </a:r>
+          </a:p>
+          <a:p>
+            <a:r>
+              <a:t>- Learning fine-grained discriminative features for category discovery</a:t>
+            </a:r>
+          </a:p>
+          <a:p>
+            <a:r>
+              <a:t>- Validation of XCon's effectiveness through performance improvements in experiments</a:t>
             </a:r>
           </a:p>
         </p:txBody>
@@ -3264,17 +3264,17 @@
           <a:lstStyle/>
           <a:p>
             <a:r>
-              <a:t>- Addressing the problem of generalized category discovery (GCD)</a:t>
-            </a:r>
-          </a:p>
-          <a:p>
-            <a:r>
-              <a:t>- Introducing Expert-Contrastive Learning (XCon) method for mining useful information from images</a:t>
-            </a:r>
-          </a:p>
-          <a:p>
-            <a:r>
-              <a:t>- Utilizing k-means clustering and contrastive learning on sub-datasets for learning discriminative features</a:t>
+              <a:t>- Addressing the problem of Generalized Category Discovery (GCD)</a:t>
+            </a:r>
+          </a:p>
+          <a:p>
+            <a:r>
+              <a:t>- Introducing Expert-Contrastive Learning (XCon) for mining useful information from images</a:t>
+            </a:r>
+          </a:p>
+          <a:p>
+            <a:r>
+              <a:t>- Utilizing k-means clustering and contrastive learning to learn discriminative features</a:t>
             </a:r>
           </a:p>
         </p:txBody>
@@ -3313,7 +3313,7 @@
           <a:lstStyle/>
           <a:p>
             <a:r>
-              <a:t>Problem Statement</a:t>
+              <a:t>Motivation</a:t>
             </a:r>
           </a:p>
         </p:txBody>
@@ -3334,17 +3334,12 @@
           <a:lstStyle/>
           <a:p>
             <a:r>
-              <a:t>- GCD involves discovering categories within unlabeled data by leveraging information</a:t>
-            </a:r>
-          </a:p>
-          <a:p>
-            <a:r>
-              <a:t>- Existing methods tend to cluster based on class-irrelevant cues, leading to suboptimal results</a:t>
-            </a:r>
-          </a:p>
-          <a:p>
-            <a:r>
-              <a:t>- Need for fine-grained category discovery with a focus on relevant concepts</a:t>
+              <a:t>- Importance of Generalized Category Discovery in real-world applications</a:t>
+            </a:r>
+          </a:p>
+          <a:p>
+            <a:r>
+              <a:t>- Contrasting unsupervised representation clustering with class-irrelevant cues vs. XCon's discriminative feature learning</a:t>
             </a:r>
           </a:p>
         </p:txBody>
@@ -3383,7 +3378,7 @@
           <a:lstStyle/>
           <a:p>
             <a:r>
-              <a:t>XCon Methodology</a:t>
+              <a:t>XCon Method</a:t>
             </a:r>
           </a:p>
         </p:txBody>
@@ -3404,17 +3399,17 @@
           <a:lstStyle/>
           <a:p>
             <a:r>
-              <a:t>- Partitioning data into k expert sub-datasets using k-means clustering on self-supervised representations</a:t>
-            </a:r>
-          </a:p>
-          <a:p>
-            <a:r>
-              <a:t>- Each sub-dataset acts as an expert dataset to eliminate negative influences of class-irrelevant cues</a:t>
-            </a:r>
-          </a:p>
-          <a:p>
-            <a:r>
-              <a:t>- Learning discriminative features for fine-grained category discovery</a:t>
+              <a:t>- Expert-Contrastive Learning approach with k-means partitioning into expert sub-datasets</a:t>
+            </a:r>
+          </a:p>
+          <a:p>
+            <a:r>
+              <a:t>- Eliminating negative influence of class-irrelevant cues for fine-grained category discovery</a:t>
+            </a:r>
+          </a:p>
+          <a:p>
+            <a:r>
+              <a:t>- Using XCon for learning discriminative features and discovering new object categories</a:t>
             </a:r>
           </a:p>
         </p:txBody>
@@ -3453,7 +3448,7 @@
           <a:lstStyle/>
           <a:p>
             <a:r>
-              <a:t>Novel Category Discovery</a:t>
+              <a:t>Contrastive Learning in GCD</a:t>
             </a:r>
           </a:p>
         </p:txBody>
@@ -3474,17 +3469,17 @@
           <a:lstStyle/>
           <a:p>
             <a:r>
-              <a:t>- Objective: Discover new object categories by transferring knowledge learned from seen classes</a:t>
-            </a:r>
-          </a:p>
-          <a:p>
-            <a:r>
-              <a:t>- XCon partitions data into k sub-datasets for learning discriminative representations</a:t>
-            </a:r>
-          </a:p>
-          <a:p>
-            <a:r>
-              <a:t>- Setting a new state-of-the-art performance on tested category discovery benchmarks</a:t>
+              <a:t>- Leveraging contrastive learning for effective representation learning in GCD</a:t>
+            </a:r>
+          </a:p>
+          <a:p>
+            <a:r>
+              <a:t>- Using k-means grouping on self-supervised features for informative pairs</a:t>
+            </a:r>
+          </a:p>
+          <a:p>
+            <a:r>
+              <a:t>- Focus on fine-grained category discovery with feature partitioning and contrastive pairs creation</a:t>
             </a:r>
           </a:p>
         </p:txBody>
@@ -3523,7 +3518,7 @@
           <a:lstStyle/>
           <a:p>
             <a:r>
-              <a:t>Previous Work</a:t>
+              <a:t>Fine-grained GCD Challenges</a:t>
             </a:r>
           </a:p>
         </p:txBody>
@@ -3544,17 +3539,17 @@
           <a:lstStyle/>
           <a:p>
             <a:r>
-              <a:t>- Contrastive learning in NCD problem by NCL</a:t>
-            </a:r>
-          </a:p>
-          <a:p>
-            <a:r>
-              <a:t>- Using k-means grouping on self-supervised features for informative contrastive pairs</a:t>
-            </a:r>
-          </a:p>
-          <a:p>
-            <a:r>
-              <a:t>- Focus on Generalized Category Discovery for effective representation learning</a:t>
+              <a:t>- Detailed discriminative traits requirement for representation learning</a:t>
+            </a:r>
+          </a:p>
+          <a:p>
+            <a:r>
+              <a:t>- Utilizing self-supervised representations and k-means clustering for feature integration</a:t>
+            </a:r>
+          </a:p>
+          <a:p>
+            <a:r>
+              <a:t>- Applying supervised and self-supervised contrastive losses for feature refinement</a:t>
             </a:r>
           </a:p>
         </p:txBody>
@@ -3593,7 +3588,7 @@
           <a:lstStyle/>
           <a:p>
             <a:r>
-              <a:t>Experimental Results (Generic Datasets)</a:t>
+              <a:t>Results on Generic Datasets</a:t>
             </a:r>
           </a:p>
         </p:txBody>
@@ -3614,17 +3609,17 @@
           <a:lstStyle/>
           <a:p>
             <a:r>
-              <a:t>- Results on CIFAR10, CIFAR100, Stanford Cars, etc.</a:t>
-            </a:r>
-          </a:p>
-          <a:p>
-            <a:r>
-              <a:t>- XCon outperforms baseline methods, showing consistent improvement</a:t>
-            </a:r>
-          </a:p>
-          <a:p>
-            <a:r>
-              <a:t>- Evaluation metric: Clustering accuracy (ACC) on unlabeled dataset</a:t>
+              <a:t>- Evaluation on CIFAR10, CIFAR100, Stanford Cars, and ImageNet benchmarks</a:t>
+            </a:r>
+          </a:p>
+          <a:p>
+            <a:r>
+              <a:t>- Performance improvement comparison with state-of-the-art methods</a:t>
+            </a:r>
+          </a:p>
+          <a:p>
+            <a:r>
+              <a:t>- Application of semi-supervised k-means for evaluation metrics</a:t>
             </a:r>
           </a:p>
         </p:txBody>
@@ -3663,7 +3658,7 @@
           <a:lstStyle/>
           <a:p>
             <a:r>
-              <a:t>Experimental Results (Fine-grained Datasets)</a:t>
+              <a:t>Results on Fine-grained Datasets</a:t>
             </a:r>
           </a:p>
         </p:txBody>
@@ -3684,17 +3679,17 @@
           <a:lstStyle/>
           <a:p>
             <a:r>
-              <a:t>- Performance on fine-grained image classification benchmarks</a:t>
-            </a:r>
-          </a:p>
-          <a:p>
-            <a:r>
-              <a:t>- Improved ACC on CUB-200 and Stanford Cars with XCon</a:t>
-            </a:r>
-          </a:p>
-          <a:p>
-            <a:r>
-              <a:t>- Analysis of weight parameter α for fine-grained loss</a:t>
+              <a:t>- Enhanced performance on CUB-200 and Standford Cars</a:t>
+            </a:r>
+          </a:p>
+          <a:p>
+            <a:r>
+              <a:t>- Comparison of XCon with baseline under different parameters</a:t>
+            </a:r>
+          </a:p>
+          <a:p>
+            <a:r>
+              <a:t>- Robust effectiveness analysis of XCon on fine-grained category discovery</a:t>
             </a:r>
           </a:p>
         </p:txBody>
@@ -3754,17 +3749,17 @@
           <a:lstStyle/>
           <a:p>
             <a:r>
-              <a:t>- Visualization of feature space with XCon compared to DINO</a:t>
-            </a:r>
-          </a:p>
-          <a:p>
-            <a:r>
-              <a:t>- Clear boundaries between groups corresponding to different categories</a:t>
-            </a:r>
-          </a:p>
-          <a:p>
-            <a:r>
-              <a:t>- Demonstrating discriminative features learned by XCon</a:t>
+              <a:t>- Visualization of feature clustering in CIFAR10 using XCon</a:t>
+            </a:r>
+          </a:p>
+          <a:p>
+            <a:r>
+              <a:t>- Clear boundaries between distinct categories with XCon's discriminative features</a:t>
+            </a:r>
+          </a:p>
+          <a:p>
+            <a:r>
+              <a:t>- Improved categorization based on fine-grained features compared to DINO</a:t>
             </a:r>
           </a:p>
         </p:txBody>

</xml_diff>

<commit_message>
converter in .py format
</commit_message>
<xml_diff>
--- a/presentation.pptx
+++ b/presentation.pptx
@@ -3510,7 +3510,7 @@
                 <a:latin typeface="Montserrat"/>
                 <a:ea typeface="Montserrat"/>
               </a:rPr>
-              <a:t>XCon is a promising method for fine-grained category discovery, showcasing clear performance improvements in experiments. The method is effective and robust across various datasets.</a:t>
+              <a:t>XCon offers a novel approach to generalized category discovery, leveraging self-supervised representations and contrastive learning. Experimental results validate the method's effectiveness in discovering novel categories.</a:t>
             </a:r>
             <a:endParaRPr b="0" lang="en-US" sz="2000" spc="-1" strike="noStrike">
               <a:latin typeface="Arial"/>
@@ -3721,7 +3721,7 @@
                 <a:latin typeface="Montserrat"/>
                 <a:ea typeface="Montserrat"/>
               </a:rPr>
-              <a:t>We introduce Expert Contrastive Learning (XCon) for Fine-grained Category Discovery to mine useful information from images.</a:t>
+              <a:t>We introduce the problem of Generalized Category Discovery (GCD) and present the Expert-Contrastive Learning (XCon) method for fine-grained category discovery.</a:t>
             </a:r>
             <a:endParaRPr b="0" lang="en-US" sz="2000" spc="-1" strike="noStrike">
               <a:latin typeface="Arial"/>
@@ -3876,7 +3876,7 @@
                 <a:latin typeface="Montserrat ExtraBold"/>
                 <a:ea typeface="Montserrat ExtraBold"/>
               </a:rPr>
-              <a:t>Problem Statement</a:t>
+              <a:t>Problem Overview</a:t>
             </a:r>
             <a:endParaRPr b="0" lang="en-US" sz="2400" spc="-1" strike="noStrike">
               <a:latin typeface="Arial"/>
@@ -3930,7 +3930,7 @@
                 <a:latin typeface="Montserrat"/>
                 <a:ea typeface="Montserrat"/>
               </a:rPr>
-              <a:t>Generalized Category Discovery (GCD) aims to discover new categories within unlabeled data by leveraging information. XCon addresses the fine-grained concept discovery.</a:t>
+              <a:t>GCD allows us to discover categories within unlabeled data by leveraging information. Existing methods often cluster data based on class-irrelevant cues, while XCon aims to learn discriminative features for fine-grained category discovery.</a:t>
             </a:r>
             <a:endParaRPr b="0" lang="en-US" sz="2000" spc="-1" strike="noStrike">
               <a:latin typeface="Arial"/>
@@ -4080,7 +4080,7 @@
                 <a:latin typeface="Montserrat ExtraBold"/>
                 <a:ea typeface="Montserrat ExtraBold"/>
               </a:rPr>
-              <a:t>XCon Method</a:t>
+              <a:t>Expert-Contrastive Learning</a:t>
             </a:r>
             <a:endParaRPr b="0" lang="en-US" sz="2400" spc="-1" strike="noStrike">
               <a:latin typeface="Arial"/>
@@ -4134,7 +4134,7 @@
                 <a:latin typeface="Montserrat"/>
                 <a:ea typeface="Montserrat"/>
               </a:rPr>
-              <a:t>XCon partitions data into k expert sub-datasets using k-means clustering on self-supervised representations. This eliminates class-irrelevant cues and learns discriminative features.</a:t>
+              <a:t>XCon partitions data into k expert sub-datasets using k-means clustering on self-supervised representations. Contrastive learning is then performed on each sub-dataset to learn discriminative features for category discovery.</a:t>
             </a:r>
             <a:endParaRPr b="0" lang="en-US" sz="2000" spc="-1" strike="noStrike">
               <a:latin typeface="Arial"/>
@@ -4284,7 +4284,7 @@
                 <a:latin typeface="Montserrat ExtraBold"/>
                 <a:ea typeface="Montserrat ExtraBold"/>
               </a:rPr>
-              <a:t>Novel Category Discovery</a:t>
+              <a:t>Novelties</a:t>
             </a:r>
             <a:endParaRPr b="0" lang="en-US" sz="2400" spc="-1" strike="noStrike">
               <a:latin typeface="Arial"/>
@@ -4338,7 +4338,7 @@
                 <a:latin typeface="Montserrat"/>
                 <a:ea typeface="Montserrat"/>
               </a:rPr>
-              <a:t>XCon is effective for fine-grained category discovery by transferring knowledge from relevant but different seen classes. The method sets a new state-of-the-art performance on tested benchmarks.</a:t>
+              <a:t>XCon addresses the challenge of fine-grained category discovery by partitioning data into sub-datasets and leveraging contrastive learning. It outperforms existing methods in discovering new categories and learning discriminative features.</a:t>
             </a:r>
             <a:endParaRPr b="0" lang="en-US" sz="2000" spc="-1" strike="noStrike">
               <a:latin typeface="Arial"/>
@@ -4488,7 +4488,7 @@
                 <a:latin typeface="Montserrat ExtraBold"/>
                 <a:ea typeface="Montserrat ExtraBold"/>
               </a:rPr>
-              <a:t>Contrastive Learning</a:t>
+              <a:t>Experimental Results</a:t>
             </a:r>
             <a:endParaRPr b="0" lang="en-US" sz="2400" spc="-1" strike="noStrike">
               <a:latin typeface="Arial"/>
@@ -4542,7 +4542,7 @@
                 <a:latin typeface="Montserrat"/>
                 <a:ea typeface="Montserrat"/>
               </a:rPr>
-              <a:t>XCon uses k-means grouping on self-supervised features to create informative contrastive pairs for learning representations. This approach enhances discoverability of novel fine-grained categories.</a:t>
+              <a:t>XCon demonstrates improved performance on generic image classification benchmarks and fine-grained datasets compared to state-of-the-art methods. We validate the effectiveness of XCon through various experiments.</a:t>
             </a:r>
             <a:endParaRPr b="0" lang="en-US" sz="2000" spc="-1" strike="noStrike">
               <a:latin typeface="Arial"/>
@@ -4692,7 +4692,7 @@
                 <a:latin typeface="Montserrat ExtraBold"/>
                 <a:ea typeface="Montserrat ExtraBold"/>
               </a:rPr>
-              <a:t>Experimental Results</a:t>
+              <a:t>Evaluation Metrics</a:t>
             </a:r>
             <a:endParaRPr b="0" lang="en-US" sz="2400" spc="-1" strike="noStrike">
               <a:latin typeface="Arial"/>
@@ -4746,7 +4746,7 @@
                 <a:latin typeface="Montserrat"/>
                 <a:ea typeface="Montserrat"/>
               </a:rPr>
-              <a:t>XCon outperforms existing methods on generic image classification and fine-grained datasets. Performance improvements are significant across various benchmarks.</a:t>
+              <a:t>We measure performance using clustering accuracy (ACC) on unlabeled data, evaluating the effectiveness of XCon in discovering categories. Results show consistent improvements over baseline methods.</a:t>
             </a:r>
             <a:endParaRPr b="0" lang="en-US" sz="2000" spc="-1" strike="noStrike">
               <a:latin typeface="Arial"/>
@@ -4896,7 +4896,7 @@
                 <a:latin typeface="Montserrat ExtraBold"/>
                 <a:ea typeface="Montserrat ExtraBold"/>
               </a:rPr>
-              <a:t>Model Evaluation</a:t>
+              <a:t>Comparative Analysis</a:t>
             </a:r>
             <a:endParaRPr b="0" lang="en-US" sz="2400" spc="-1" strike="noStrike">
               <a:latin typeface="Arial"/>
@@ -4950,7 +4950,7 @@
                 <a:latin typeface="Montserrat"/>
                 <a:ea typeface="Montserrat"/>
               </a:rPr>
-              <a:t>Evaluation metrics include clustering accuracy on unlabeled data. XCon consistently shows robust effectiveness with different weights and numbers of sub-datasets.</a:t>
+              <a:t>XCon outperforms existing methods on fine-grained image classification benchmarks like CUB-200 and Standford Cars. The method's robustness is demonstrated through various alpha values.</a:t>
             </a:r>
             <a:endParaRPr b="0" lang="en-US" sz="2000" spc="-1" strike="noStrike">
               <a:latin typeface="Arial"/>
@@ -5154,7 +5154,7 @@
                 <a:latin typeface="Montserrat"/>
                 <a:ea typeface="Montserrat"/>
               </a:rPr>
-              <a:t>XCon provides clear boundaries between different groups in datasets like CIFAR10, demonstrating the effectiveness of learned discriminative features.</a:t>
+              <a:t>Visualizations show clear boundaries between groups in XCon's learned features, indicating discriminative representations for fine-grained category discovery. Comparison with DINO features highlights XCon's effectiveness.</a:t>
             </a:r>
             <a:endParaRPr b="0" lang="en-US" sz="2000" spc="-1" strike="noStrike">
               <a:latin typeface="Arial"/>

</xml_diff>